<commit_message>
Ch5 and 6 correction
</commit_message>
<xml_diff>
--- a/R/dsieur_ch5n6.pptx
+++ b/R/dsieur_ch5n6.pptx
@@ -3343,7 +3343,12 @@
             </a:pPr>
             <a:r>
               <a:rPr/>
-              <a:t>library(tidyverse) library(janitor)</a:t>
+              <a:t>library(tidyverse)</a:t>
+            </a:r>
+            <a:br/>
+            <a:r>
+              <a:rPr/>
+              <a:t>library(janitor)</a:t>
             </a:r>
           </a:p>
           <a:p>

</xml_diff>